<commit_message>
q3-checkpoint 3 for brain blast 3.1 slides
</commit_message>
<xml_diff>
--- a/presentations/6/q3_brain_blast/R3-A09 Brain Blast PPT 3.1.pptx
+++ b/presentations/6/q3_brain_blast/R3-A09 Brain Blast PPT 3.1.pptx
@@ -30746,7 +30746,10 @@
           <a:noFill/>
           <a:ln w="19050">
             <a:solidFill>
-              <a:srgbClr val="FF4343"/>
+              <a:schemeClr val="accent2">
+                <a:lumMod val="60000"/>
+                <a:lumOff val="40000"/>
+              </a:schemeClr>
             </a:solidFill>
           </a:ln>
         </p:spPr>
@@ -30774,12 +30777,22 @@
             <a:r>
               <a:rPr lang="en-US" sz="6000" b="1" dirty="0">
                 <a:solidFill>
-                  <a:srgbClr val="FF4343"/>
+                  <a:schemeClr val="accent2">
+                    <a:lumMod val="60000"/>
+                    <a:lumOff val="40000"/>
+                  </a:schemeClr>
                 </a:solidFill>
               </a:rPr>
               <a:t>45</a:t>
             </a:r>
-            <a:endParaRPr lang="en-US" dirty="0"/>
+            <a:endParaRPr lang="en-US" dirty="0">
+              <a:solidFill>
+                <a:schemeClr val="accent2">
+                  <a:lumMod val="60000"/>
+                  <a:lumOff val="40000"/>
+                </a:schemeClr>
+              </a:solidFill>
+            </a:endParaRPr>
           </a:p>
         </p:txBody>
       </p:sp>
@@ -33174,66 +33187,6 @@
       </p:sp>
       <p:sp>
         <p:nvSpPr>
-          <p:cNvPr id="26" name="Oval 25">
-            <a:extLst>
-              <a:ext uri="{FF2B5EF4-FFF2-40B4-BE49-F238E27FC236}">
-                <a16:creationId xmlns:a16="http://schemas.microsoft.com/office/drawing/2014/main" id="{37B2AFA7-FEDE-4061-8ABD-6E41AD917250}"/>
-              </a:ext>
-            </a:extLst>
-          </p:cNvPr>
-          <p:cNvSpPr/>
-          <p:nvPr/>
-        </p:nvSpPr>
-        <p:spPr>
-          <a:xfrm rot="19982806">
-            <a:off x="2894428" y="2095385"/>
-            <a:ext cx="1549284" cy="1549284"/>
-          </a:xfrm>
-          <a:prstGeom prst="ellipse">
-            <a:avLst/>
-          </a:prstGeom>
-          <a:noFill/>
-          <a:ln w="19050">
-            <a:solidFill>
-              <a:srgbClr val="FF4343"/>
-            </a:solidFill>
-          </a:ln>
-        </p:spPr>
-        <p:style>
-          <a:lnRef idx="2">
-            <a:schemeClr val="accent1">
-              <a:shade val="50000"/>
-            </a:schemeClr>
-          </a:lnRef>
-          <a:fillRef idx="1">
-            <a:schemeClr val="accent1"/>
-          </a:fillRef>
-          <a:effectRef idx="0">
-            <a:schemeClr val="accent1"/>
-          </a:effectRef>
-          <a:fontRef idx="minor">
-            <a:schemeClr val="lt1"/>
-          </a:fontRef>
-        </p:style>
-        <p:txBody>
-          <a:bodyPr rtlCol="0" anchor="ctr"/>
-          <a:lstStyle/>
-          <a:p>
-            <a:pPr algn="ctr"/>
-            <a:r>
-              <a:rPr lang="en-US" sz="6000" b="1" dirty="0">
-                <a:solidFill>
-                  <a:srgbClr val="FF4343"/>
-                </a:solidFill>
-              </a:rPr>
-              <a:t>45</a:t>
-            </a:r>
-            <a:endParaRPr lang="en-US" dirty="0"/>
-          </a:p>
-        </p:txBody>
-      </p:sp>
-      <p:sp>
-        <p:nvSpPr>
           <p:cNvPr id="27" name="Subtitle 2">
             <a:extLst>
               <a:ext uri="{FF2B5EF4-FFF2-40B4-BE49-F238E27FC236}">
@@ -34088,6 +34041,79 @@
             <a:endParaRPr lang="en-US" dirty="0">
               <a:solidFill>
                 <a:srgbClr val="59FF43"/>
+              </a:solidFill>
+            </a:endParaRPr>
+          </a:p>
+        </p:txBody>
+      </p:sp>
+      <p:sp>
+        <p:nvSpPr>
+          <p:cNvPr id="17" name="Oval 16">
+            <a:extLst>
+              <a:ext uri="{FF2B5EF4-FFF2-40B4-BE49-F238E27FC236}">
+                <a16:creationId xmlns:a16="http://schemas.microsoft.com/office/drawing/2014/main" id="{81D2474F-33AE-43BA-A0CE-DD87D787D15A}"/>
+              </a:ext>
+            </a:extLst>
+          </p:cNvPr>
+          <p:cNvSpPr/>
+          <p:nvPr/>
+        </p:nvSpPr>
+        <p:spPr>
+          <a:xfrm rot="19982806">
+            <a:off x="2894428" y="2095385"/>
+            <a:ext cx="1549284" cy="1549284"/>
+          </a:xfrm>
+          <a:prstGeom prst="ellipse">
+            <a:avLst/>
+          </a:prstGeom>
+          <a:noFill/>
+          <a:ln w="19050">
+            <a:solidFill>
+              <a:schemeClr val="accent2">
+                <a:lumMod val="60000"/>
+                <a:lumOff val="40000"/>
+              </a:schemeClr>
+            </a:solidFill>
+          </a:ln>
+        </p:spPr>
+        <p:style>
+          <a:lnRef idx="2">
+            <a:schemeClr val="accent1">
+              <a:shade val="50000"/>
+            </a:schemeClr>
+          </a:lnRef>
+          <a:fillRef idx="1">
+            <a:schemeClr val="accent1"/>
+          </a:fillRef>
+          <a:effectRef idx="0">
+            <a:schemeClr val="accent1"/>
+          </a:effectRef>
+          <a:fontRef idx="minor">
+            <a:schemeClr val="lt1"/>
+          </a:fontRef>
+        </p:style>
+        <p:txBody>
+          <a:bodyPr rtlCol="0" anchor="ctr"/>
+          <a:lstStyle/>
+          <a:p>
+            <a:pPr algn="ctr"/>
+            <a:r>
+              <a:rPr lang="en-US" sz="6000" b="1" dirty="0">
+                <a:solidFill>
+                  <a:schemeClr val="accent2">
+                    <a:lumMod val="60000"/>
+                    <a:lumOff val="40000"/>
+                  </a:schemeClr>
+                </a:solidFill>
+              </a:rPr>
+              <a:t>45</a:t>
+            </a:r>
+            <a:endParaRPr lang="en-US" dirty="0">
+              <a:solidFill>
+                <a:schemeClr val="accent2">
+                  <a:lumMod val="60000"/>
+                  <a:lumOff val="40000"/>
+                </a:schemeClr>
               </a:solidFill>
             </a:endParaRPr>
           </a:p>
@@ -35109,66 +35135,6 @@
       </p:sp>
       <p:sp>
         <p:nvSpPr>
-          <p:cNvPr id="26" name="Oval 25">
-            <a:extLst>
-              <a:ext uri="{FF2B5EF4-FFF2-40B4-BE49-F238E27FC236}">
-                <a16:creationId xmlns:a16="http://schemas.microsoft.com/office/drawing/2014/main" id="{37B2AFA7-FEDE-4061-8ABD-6E41AD917250}"/>
-              </a:ext>
-            </a:extLst>
-          </p:cNvPr>
-          <p:cNvSpPr/>
-          <p:nvPr/>
-        </p:nvSpPr>
-        <p:spPr>
-          <a:xfrm rot="19982806">
-            <a:off x="2894428" y="2095385"/>
-            <a:ext cx="1549284" cy="1549284"/>
-          </a:xfrm>
-          <a:prstGeom prst="ellipse">
-            <a:avLst/>
-          </a:prstGeom>
-          <a:noFill/>
-          <a:ln w="19050">
-            <a:solidFill>
-              <a:srgbClr val="FF4343"/>
-            </a:solidFill>
-          </a:ln>
-        </p:spPr>
-        <p:style>
-          <a:lnRef idx="2">
-            <a:schemeClr val="accent1">
-              <a:shade val="50000"/>
-            </a:schemeClr>
-          </a:lnRef>
-          <a:fillRef idx="1">
-            <a:schemeClr val="accent1"/>
-          </a:fillRef>
-          <a:effectRef idx="0">
-            <a:schemeClr val="accent1"/>
-          </a:effectRef>
-          <a:fontRef idx="minor">
-            <a:schemeClr val="lt1"/>
-          </a:fontRef>
-        </p:style>
-        <p:txBody>
-          <a:bodyPr rtlCol="0" anchor="ctr"/>
-          <a:lstStyle/>
-          <a:p>
-            <a:pPr algn="ctr"/>
-            <a:r>
-              <a:rPr lang="en-US" sz="6000" b="1" dirty="0">
-                <a:solidFill>
-                  <a:srgbClr val="FF4343"/>
-                </a:solidFill>
-              </a:rPr>
-              <a:t>45</a:t>
-            </a:r>
-            <a:endParaRPr lang="en-US" dirty="0"/>
-          </a:p>
-        </p:txBody>
-      </p:sp>
-      <p:sp>
-        <p:nvSpPr>
           <p:cNvPr id="27" name="Subtitle 2">
             <a:extLst>
               <a:ext uri="{FF2B5EF4-FFF2-40B4-BE49-F238E27FC236}">
@@ -35996,6 +35962,79 @@
             <a:endParaRPr lang="en-US" dirty="0">
               <a:solidFill>
                 <a:srgbClr val="59FF43"/>
+              </a:solidFill>
+            </a:endParaRPr>
+          </a:p>
+        </p:txBody>
+      </p:sp>
+      <p:sp>
+        <p:nvSpPr>
+          <p:cNvPr id="17" name="Oval 16">
+            <a:extLst>
+              <a:ext uri="{FF2B5EF4-FFF2-40B4-BE49-F238E27FC236}">
+                <a16:creationId xmlns:a16="http://schemas.microsoft.com/office/drawing/2014/main" id="{D9750302-E48A-4FB1-8B2B-56AA669F747F}"/>
+              </a:ext>
+            </a:extLst>
+          </p:cNvPr>
+          <p:cNvSpPr/>
+          <p:nvPr/>
+        </p:nvSpPr>
+        <p:spPr>
+          <a:xfrm rot="19982806">
+            <a:off x="2894428" y="2095385"/>
+            <a:ext cx="1549284" cy="1549284"/>
+          </a:xfrm>
+          <a:prstGeom prst="ellipse">
+            <a:avLst/>
+          </a:prstGeom>
+          <a:noFill/>
+          <a:ln w="19050">
+            <a:solidFill>
+              <a:schemeClr val="accent2">
+                <a:lumMod val="60000"/>
+                <a:lumOff val="40000"/>
+              </a:schemeClr>
+            </a:solidFill>
+          </a:ln>
+        </p:spPr>
+        <p:style>
+          <a:lnRef idx="2">
+            <a:schemeClr val="accent1">
+              <a:shade val="50000"/>
+            </a:schemeClr>
+          </a:lnRef>
+          <a:fillRef idx="1">
+            <a:schemeClr val="accent1"/>
+          </a:fillRef>
+          <a:effectRef idx="0">
+            <a:schemeClr val="accent1"/>
+          </a:effectRef>
+          <a:fontRef idx="minor">
+            <a:schemeClr val="lt1"/>
+          </a:fontRef>
+        </p:style>
+        <p:txBody>
+          <a:bodyPr rtlCol="0" anchor="ctr"/>
+          <a:lstStyle/>
+          <a:p>
+            <a:pPr algn="ctr"/>
+            <a:r>
+              <a:rPr lang="en-US" sz="6000" b="1" dirty="0">
+                <a:solidFill>
+                  <a:schemeClr val="accent2">
+                    <a:lumMod val="60000"/>
+                    <a:lumOff val="40000"/>
+                  </a:schemeClr>
+                </a:solidFill>
+              </a:rPr>
+              <a:t>45</a:t>
+            </a:r>
+            <a:endParaRPr lang="en-US" dirty="0">
+              <a:solidFill>
+                <a:schemeClr val="accent2">
+                  <a:lumMod val="60000"/>
+                  <a:lumOff val="40000"/>
+                </a:schemeClr>
               </a:solidFill>
             </a:endParaRPr>
           </a:p>
@@ -40355,7 +40394,7 @@
                 </a:solidFill>
                 <a:latin typeface="+mj-lt"/>
               </a:rPr>
-              <a:t>capable of identifying our 37 chords</a:t>
+              <a:t>capable of identifying our 37 chord types</a:t>
             </a:r>
           </a:p>
         </p:txBody>

</xml_diff>